<commit_message>
Fixed examples for Modifications
</commit_message>
<xml_diff>
--- a/Doc/Prezentace-dotazovani-cud.pptx
+++ b/Doc/Prezentace-dotazovani-cud.pptx
@@ -262,7 +262,7 @@
           <a:p>
             <a:fld id="{8725CDB3-0518-4E68-B4FF-B948AD6ADE2B}" type="datetimeFigureOut">
               <a:rPr lang="cs-CZ" smtClean="0"/>
-              <a:t>06.12.2015</a:t>
+              <a:t>09.12.2015</a:t>
             </a:fld>
             <a:endParaRPr lang="cs-CZ"/>
           </a:p>
@@ -432,7 +432,7 @@
           <a:p>
             <a:fld id="{8725CDB3-0518-4E68-B4FF-B948AD6ADE2B}" type="datetimeFigureOut">
               <a:rPr lang="cs-CZ" smtClean="0"/>
-              <a:t>06.12.2015</a:t>
+              <a:t>09.12.2015</a:t>
             </a:fld>
             <a:endParaRPr lang="cs-CZ"/>
           </a:p>
@@ -612,7 +612,7 @@
           <a:p>
             <a:fld id="{8725CDB3-0518-4E68-B4FF-B948AD6ADE2B}" type="datetimeFigureOut">
               <a:rPr lang="cs-CZ" smtClean="0"/>
-              <a:t>06.12.2015</a:t>
+              <a:t>09.12.2015</a:t>
             </a:fld>
             <a:endParaRPr lang="cs-CZ"/>
           </a:p>
@@ -782,7 +782,7 @@
           <a:p>
             <a:fld id="{8725CDB3-0518-4E68-B4FF-B948AD6ADE2B}" type="datetimeFigureOut">
               <a:rPr lang="cs-CZ" smtClean="0"/>
-              <a:t>06.12.2015</a:t>
+              <a:t>09.12.2015</a:t>
             </a:fld>
             <a:endParaRPr lang="cs-CZ"/>
           </a:p>
@@ -1033,7 +1033,7 @@
           <a:p>
             <a:fld id="{8725CDB3-0518-4E68-B4FF-B948AD6ADE2B}" type="datetimeFigureOut">
               <a:rPr lang="cs-CZ" smtClean="0"/>
-              <a:t>06.12.2015</a:t>
+              <a:t>09.12.2015</a:t>
             </a:fld>
             <a:endParaRPr lang="cs-CZ"/>
           </a:p>
@@ -1265,7 +1265,7 @@
           <a:p>
             <a:fld id="{8725CDB3-0518-4E68-B4FF-B948AD6ADE2B}" type="datetimeFigureOut">
               <a:rPr lang="cs-CZ" smtClean="0"/>
-              <a:t>06.12.2015</a:t>
+              <a:t>09.12.2015</a:t>
             </a:fld>
             <a:endParaRPr lang="cs-CZ"/>
           </a:p>
@@ -1612,7 +1612,7 @@
           <a:p>
             <a:fld id="{8725CDB3-0518-4E68-B4FF-B948AD6ADE2B}" type="datetimeFigureOut">
               <a:rPr lang="cs-CZ" smtClean="0"/>
-              <a:t>06.12.2015</a:t>
+              <a:t>09.12.2015</a:t>
             </a:fld>
             <a:endParaRPr lang="cs-CZ"/>
           </a:p>
@@ -1730,7 +1730,7 @@
           <a:p>
             <a:fld id="{8725CDB3-0518-4E68-B4FF-B948AD6ADE2B}" type="datetimeFigureOut">
               <a:rPr lang="cs-CZ" smtClean="0"/>
-              <a:t>06.12.2015</a:t>
+              <a:t>09.12.2015</a:t>
             </a:fld>
             <a:endParaRPr lang="cs-CZ"/>
           </a:p>
@@ -1848,7 +1848,7 @@
           <a:p>
             <a:fld id="{8725CDB3-0518-4E68-B4FF-B948AD6ADE2B}" type="datetimeFigureOut">
               <a:rPr lang="cs-CZ" smtClean="0"/>
-              <a:t>06.12.2015</a:t>
+              <a:t>09.12.2015</a:t>
             </a:fld>
             <a:endParaRPr lang="cs-CZ"/>
           </a:p>
@@ -2132,7 +2132,7 @@
           <a:p>
             <a:fld id="{8725CDB3-0518-4E68-B4FF-B948AD6ADE2B}" type="datetimeFigureOut">
               <a:rPr lang="cs-CZ" smtClean="0"/>
-              <a:t>06.12.2015</a:t>
+              <a:t>09.12.2015</a:t>
             </a:fld>
             <a:endParaRPr lang="cs-CZ"/>
           </a:p>
@@ -2396,7 +2396,7 @@
           <a:p>
             <a:fld id="{8725CDB3-0518-4E68-B4FF-B948AD6ADE2B}" type="datetimeFigureOut">
               <a:rPr lang="cs-CZ" smtClean="0"/>
-              <a:t>06.12.2015</a:t>
+              <a:t>09.12.2015</a:t>
             </a:fld>
             <a:endParaRPr lang="cs-CZ"/>
           </a:p>
@@ -2610,7 +2610,7 @@
           <a:p>
             <a:fld id="{8725CDB3-0518-4E68-B4FF-B948AD6ADE2B}" type="datetimeFigureOut">
               <a:rPr lang="cs-CZ" smtClean="0"/>
-              <a:t>06.12.2015</a:t>
+              <a:t>09.12.2015</a:t>
             </a:fld>
             <a:endParaRPr lang="cs-CZ"/>
           </a:p>
@@ -3702,10 +3702,6 @@
               </a:rPr>
               <a:t>Uloží změny do DB v rámci transakce</a:t>
             </a:r>
-            <a:endParaRPr lang="cs-CZ" sz="2400" dirty="0" smtClean="0">
-              <a:latin typeface="Segoe UI" panose="020B0502040204020203" pitchFamily="34" charset="0"/>
-              <a:cs typeface="Segoe UI" panose="020B0502040204020203" pitchFamily="34" charset="0"/>
-            </a:endParaRPr>
           </a:p>
         </p:txBody>
       </p:sp>
@@ -6567,14 +6563,7 @@
                 <a:latin typeface="Segoe UI" panose="020B0502040204020203" pitchFamily="34" charset="0"/>
                 <a:cs typeface="Segoe UI" panose="020B0502040204020203" pitchFamily="34" charset="0"/>
               </a:rPr>
-              <a:t>Tz</a:t>
-            </a:r>
-            <a:r>
-              <a:rPr lang="cs-CZ" sz="2400" dirty="0" smtClean="0">
-                <a:latin typeface="Segoe UI" panose="020B0502040204020203" pitchFamily="34" charset="0"/>
-                <a:cs typeface="Segoe UI" panose="020B0502040204020203" pitchFamily="34" charset="0"/>
-              </a:rPr>
-              <a:t>n.: musí se jednat o objekt </a:t>
+              <a:t>Tzn.: musí se jednat o objekt </a:t>
             </a:r>
             <a:r>
               <a:rPr lang="cs-CZ" sz="2400" dirty="0" err="1" smtClean="0">
@@ -7692,35 +7681,18 @@
                 <a:latin typeface="Consolas" panose="020B0609020204030204" pitchFamily="49" charset="0"/>
                 <a:cs typeface="Segoe UI" panose="020B0502040204020203" pitchFamily="34" charset="0"/>
               </a:rPr>
-              <a:t>Remove</a:t>
-            </a:r>
-            <a:r>
-              <a:rPr lang="cs-CZ" sz="2300" dirty="0" err="1" smtClean="0">
+              <a:t>RemoveRange</a:t>
+            </a:r>
+            <a:r>
+              <a:rPr lang="cs-CZ" sz="2300" dirty="0" smtClean="0">
                 <a:solidFill>
                   <a:srgbClr val="00B0F0"/>
                 </a:solidFill>
                 <a:latin typeface="Consolas" panose="020B0609020204030204" pitchFamily="49" charset="0"/>
                 <a:cs typeface="Segoe UI" panose="020B0502040204020203" pitchFamily="34" charset="0"/>
               </a:rPr>
-              <a:t>Range</a:t>
-            </a:r>
-            <a:r>
-              <a:rPr lang="cs-CZ" sz="2300" dirty="0" smtClean="0">
-                <a:solidFill>
-                  <a:srgbClr val="00B0F0"/>
-                </a:solidFill>
-                <a:latin typeface="Consolas" panose="020B0609020204030204" pitchFamily="49" charset="0"/>
-                <a:cs typeface="Segoe UI" panose="020B0502040204020203" pitchFamily="34" charset="0"/>
-              </a:rPr>
               <a:t>()</a:t>
             </a:r>
-            <a:endParaRPr lang="cs-CZ" sz="2300" dirty="0" smtClean="0">
-              <a:solidFill>
-                <a:srgbClr val="00B0F0"/>
-              </a:solidFill>
-              <a:latin typeface="Consolas" panose="020B0609020204030204" pitchFamily="49" charset="0"/>
-              <a:cs typeface="Segoe UI" panose="020B0502040204020203" pitchFamily="34" charset="0"/>
-            </a:endParaRPr>
           </a:p>
           <a:p>
             <a:pPr marL="342900" indent="-342900">
@@ -8919,7 +8891,7 @@
         <p:spPr>
           <a:xfrm>
             <a:off x="241069" y="1801182"/>
-            <a:ext cx="8140690" cy="1421928"/>
+            <a:ext cx="7599003" cy="1421928"/>
           </a:xfrm>
           <a:prstGeom prst="rect">
             <a:avLst/>
@@ -8951,22 +8923,15 @@
                 <a:latin typeface="Segoe UI" panose="020B0502040204020203" pitchFamily="34" charset="0"/>
                 <a:cs typeface="Segoe UI" panose="020B0502040204020203" pitchFamily="34" charset="0"/>
               </a:rPr>
-              <a:t> realizována jako transakce   </a:t>
-            </a:r>
-            <a:r>
-              <a:rPr lang="cs-CZ" sz="2300" dirty="0" err="1" smtClean="0">
-                <a:solidFill>
-                  <a:srgbClr val="00B0F0"/>
-                </a:solidFill>
-                <a:latin typeface="Consolas" panose="020B0609020204030204" pitchFamily="49" charset="0"/>
+              <a:t> realizována jako </a:t>
+            </a:r>
+            <a:r>
+              <a:rPr lang="cs-CZ" sz="2400" dirty="0" smtClean="0">
+                <a:latin typeface="Segoe UI" panose="020B0502040204020203" pitchFamily="34" charset="0"/>
                 <a:cs typeface="Segoe UI" panose="020B0502040204020203" pitchFamily="34" charset="0"/>
               </a:rPr>
-              <a:t>serializable</a:t>
-            </a:r>
-            <a:endParaRPr lang="cs-CZ" sz="2300" dirty="0" smtClean="0">
-              <a:latin typeface="Consolas" panose="020B0609020204030204" pitchFamily="49" charset="0"/>
-              <a:cs typeface="Segoe UI" panose="020B0502040204020203" pitchFamily="34" charset="0"/>
-            </a:endParaRPr>
+              <a:t>transakce</a:t>
+            </a:r>
           </a:p>
           <a:p>
             <a:pPr marL="800100" lvl="1" indent="-342900">
@@ -8981,7 +8946,14 @@
                 <a:latin typeface="Segoe UI" panose="020B0502040204020203" pitchFamily="34" charset="0"/>
                 <a:cs typeface="Segoe UI" panose="020B0502040204020203" pitchFamily="34" charset="0"/>
               </a:rPr>
-              <a:t>Chování EF je dostačující v drtivé většině případů</a:t>
+              <a:t>Chování </a:t>
+            </a:r>
+            <a:r>
+              <a:rPr lang="cs-CZ" sz="2400" dirty="0" smtClean="0">
+                <a:latin typeface="Segoe UI" panose="020B0502040204020203" pitchFamily="34" charset="0"/>
+                <a:cs typeface="Segoe UI" panose="020B0502040204020203" pitchFamily="34" charset="0"/>
+              </a:rPr>
+              <a:t>EF je dostačující v drtivé většině případů</a:t>
             </a:r>
           </a:p>
           <a:p>
@@ -10190,7 +10162,7 @@
         <p:spPr>
           <a:xfrm>
             <a:off x="241069" y="1801182"/>
-            <a:ext cx="8140690" cy="1421928"/>
+            <a:ext cx="7599003" cy="1421928"/>
           </a:xfrm>
           <a:prstGeom prst="rect">
             <a:avLst/>
@@ -10222,17 +10194,14 @@
                 <a:latin typeface="Segoe UI" panose="020B0502040204020203" pitchFamily="34" charset="0"/>
                 <a:cs typeface="Segoe UI" panose="020B0502040204020203" pitchFamily="34" charset="0"/>
               </a:rPr>
-              <a:t> realizována jako transakce   </a:t>
-            </a:r>
-            <a:r>
-              <a:rPr lang="cs-CZ" sz="2300" dirty="0" err="1" smtClean="0">
-                <a:solidFill>
-                  <a:srgbClr val="00B0F0"/>
-                </a:solidFill>
-                <a:latin typeface="Consolas" panose="020B0609020204030204" pitchFamily="49" charset="0"/>
+              <a:t> realizována jako </a:t>
+            </a:r>
+            <a:r>
+              <a:rPr lang="cs-CZ" sz="2400" dirty="0" smtClean="0">
+                <a:latin typeface="Segoe UI" panose="020B0502040204020203" pitchFamily="34" charset="0"/>
                 <a:cs typeface="Segoe UI" panose="020B0502040204020203" pitchFamily="34" charset="0"/>
               </a:rPr>
-              <a:t>serializable</a:t>
+              <a:t>transakce</a:t>
             </a:r>
             <a:endParaRPr lang="cs-CZ" sz="2300" dirty="0" smtClean="0">
               <a:latin typeface="Consolas" panose="020B0609020204030204" pitchFamily="49" charset="0"/>
@@ -10252,21 +10221,7 @@
                 <a:latin typeface="Segoe UI" panose="020B0502040204020203" pitchFamily="34" charset="0"/>
                 <a:cs typeface="Segoe UI" panose="020B0502040204020203" pitchFamily="34" charset="0"/>
               </a:rPr>
-              <a:t>Chování </a:t>
-            </a:r>
-            <a:r>
-              <a:rPr lang="cs-CZ" sz="2400" smtClean="0">
-                <a:latin typeface="Segoe UI" panose="020B0502040204020203" pitchFamily="34" charset="0"/>
-                <a:cs typeface="Segoe UI" panose="020B0502040204020203" pitchFamily="34" charset="0"/>
-              </a:rPr>
-              <a:t>EF je dostačující </a:t>
-            </a:r>
-            <a:r>
-              <a:rPr lang="cs-CZ" sz="2400" dirty="0" smtClean="0">
-                <a:latin typeface="Segoe UI" panose="020B0502040204020203" pitchFamily="34" charset="0"/>
-                <a:cs typeface="Segoe UI" panose="020B0502040204020203" pitchFamily="34" charset="0"/>
-              </a:rPr>
-              <a:t>v drtivé většině případů</a:t>
+              <a:t>Chování EF je dostačující v drtivé většině případů</a:t>
             </a:r>
           </a:p>
           <a:p>

</xml_diff>